<commit_message>
pdf pptx 파일 수정
</commit_message>
<xml_diff>
--- a/2022184008 김성주 2DGP 2차 발표.pptx
+++ b/2022184008 김성주 2DGP 2차 발표.pptx
@@ -124,6 +124,50 @@
     <p1510:client id="{04B946FC-3731-42F5-A207-D7BD1C251774}" v="1" dt="2025-11-09T11:06:18.137"/>
   </p1510:revLst>
 </p1510:revInfo>
+</file>
+
+<file path=ppt/changesInfos/changesInfo1.xml><?xml version="1.0" encoding="utf-8"?>
+<pc:chgInfo xmlns:a="http://schemas.openxmlformats.org/drawingml/2006/main" xmlns:r="http://schemas.openxmlformats.org/officeDocument/2006/relationships" xmlns:ac="http://schemas.microsoft.com/office/drawing/2013/main/command" xmlns:pc="http://schemas.microsoft.com/office/powerpoint/2013/main/command">
+  <pc:docChgLst>
+    <pc:chgData name="821023713937" userId="4f4be03d0d3ca637" providerId="LiveId" clId="{05A86FB2-84D4-43F3-962D-3C19F40D0993}"/>
+    <pc:docChg chg="custSel modSld">
+      <pc:chgData name="821023713937" userId="4f4be03d0d3ca637" providerId="LiveId" clId="{05A86FB2-84D4-43F3-962D-3C19F40D0993}" dt="2025-11-09T12:37:07.958" v="214" actId="20577"/>
+      <pc:docMkLst>
+        <pc:docMk/>
+      </pc:docMkLst>
+      <pc:sldChg chg="modSp mod">
+        <pc:chgData name="821023713937" userId="4f4be03d0d3ca637" providerId="LiveId" clId="{05A86FB2-84D4-43F3-962D-3C19F40D0993}" dt="2025-11-09T12:36:16.510" v="210" actId="20577"/>
+        <pc:sldMkLst>
+          <pc:docMk/>
+          <pc:sldMk cId="332992400" sldId="261"/>
+        </pc:sldMkLst>
+        <pc:graphicFrameChg chg="modGraphic">
+          <ac:chgData name="821023713937" userId="4f4be03d0d3ca637" providerId="LiveId" clId="{05A86FB2-84D4-43F3-962D-3C19F40D0993}" dt="2025-11-09T12:36:16.510" v="210" actId="20577"/>
+          <ac:graphicFrameMkLst>
+            <pc:docMk/>
+            <pc:sldMk cId="332992400" sldId="261"/>
+            <ac:graphicFrameMk id="6" creationId="{ADD8DDE7-138E-9B73-3D01-E91A54A824EE}"/>
+          </ac:graphicFrameMkLst>
+        </pc:graphicFrameChg>
+      </pc:sldChg>
+      <pc:sldChg chg="modSp mod">
+        <pc:chgData name="821023713937" userId="4f4be03d0d3ca637" providerId="LiveId" clId="{05A86FB2-84D4-43F3-962D-3C19F40D0993}" dt="2025-11-09T12:37:07.958" v="214" actId="20577"/>
+        <pc:sldMkLst>
+          <pc:docMk/>
+          <pc:sldMk cId="222353441" sldId="263"/>
+        </pc:sldMkLst>
+        <pc:spChg chg="mod">
+          <ac:chgData name="821023713937" userId="4f4be03d0d3ca637" providerId="LiveId" clId="{05A86FB2-84D4-43F3-962D-3C19F40D0993}" dt="2025-11-09T12:37:07.958" v="214" actId="20577"/>
+          <ac:spMkLst>
+            <pc:docMk/>
+            <pc:sldMk cId="222353441" sldId="263"/>
+            <ac:spMk id="5" creationId="{5C47E355-1EBA-EAEC-DBAF-258ADACEE8AE}"/>
+          </ac:spMkLst>
+        </pc:spChg>
+      </pc:sldChg>
+    </pc:docChg>
+  </pc:docChgLst>
+</pc:chgInfo>
 </file>
 
 <file path=ppt/slideLayouts/slideLayout1.xml><?xml version="1.0" encoding="utf-8"?>
@@ -7066,7 +7110,11 @@
             </a:r>
             <a:r>
               <a:rPr lang="en-US" altLang="ko-KR" sz="4400" b="1" dirty="0"/>
-              <a:t>96%</a:t>
+              <a:t>95%</a:t>
+            </a:r>
+            <a:r>
+              <a:rPr lang="ko-KR" altLang="en-US" sz="4400" b="1" dirty="0"/>
+              <a:t> </a:t>
             </a:r>
             <a:endParaRPr lang="ko-KR" altLang="en-US" sz="4400" dirty="0"/>
           </a:p>
@@ -7123,7 +7171,7 @@
           <p:nvPr>
             <p:extLst>
               <p:ext uri="{D42A27DB-BD31-4B8C-83A1-F6EECF244321}">
-                <p14:modId xmlns:p14="http://schemas.microsoft.com/office/powerpoint/2010/main" val="1695442005"/>
+                <p14:modId xmlns:p14="http://schemas.microsoft.com/office/powerpoint/2010/main" val="1046595718"/>
               </p:ext>
             </p:extLst>
           </p:nvPr>
@@ -7920,7 +7968,43 @@
                       </a:pPr>
                       <a:r>
                         <a:rPr lang="ko-KR" altLang="en-US" b="1" dirty="0"/>
-                        <a:t>대전 상대와 상호작용 구현</a:t>
+                        <a:t>대전 상대와 상호작용 구현 </a:t>
+                      </a:r>
+                      <a:r>
+                        <a:rPr lang="en-US" altLang="ko-KR" b="1" dirty="0"/>
+                        <a:t>-</a:t>
+                      </a:r>
+                      <a:r>
+                        <a:rPr lang="en-US" altLang="ko-KR" b="1" dirty="0">
+                          <a:solidFill>
+                            <a:srgbClr val="FF0000"/>
+                          </a:solidFill>
+                        </a:rPr>
+                        <a:t> </a:t>
+                      </a:r>
+                      <a:r>
+                        <a:rPr lang="ko-KR" altLang="en-US" b="1" dirty="0">
+                          <a:solidFill>
+                            <a:srgbClr val="FF0000"/>
+                          </a:solidFill>
+                        </a:rPr>
+                        <a:t>캐릭터 사망 후 상태 처리와</a:t>
+                      </a:r>
+                      <a:r>
+                        <a:rPr lang="en-US" altLang="ko-KR" b="1" dirty="0">
+                          <a:solidFill>
+                            <a:srgbClr val="FF0000"/>
+                          </a:solidFill>
+                        </a:rPr>
+                        <a:t> </a:t>
+                      </a:r>
+                      <a:r>
+                        <a:rPr lang="ko-KR" altLang="en-US" b="1" dirty="0">
+                          <a:solidFill>
+                            <a:srgbClr val="FF0000"/>
+                          </a:solidFill>
+                        </a:rPr>
+                        <a:t>게임 진행 방향 미완성</a:t>
                       </a:r>
                     </a:p>
                   </a:txBody>
@@ -7987,7 +8071,7 @@
                       </a:pPr>
                       <a:r>
                         <a:rPr lang="en-US" altLang="ko-KR" b="1" dirty="0"/>
-                        <a:t>100%</a:t>
+                        <a:t>95%</a:t>
                       </a:r>
                       <a:endParaRPr lang="ko-KR" altLang="en-US" b="1" dirty="0"/>
                     </a:p>

</xml_diff>